<commit_message>
adjustment to bike share case study
</commit_message>
<xml_diff>
--- a/DataAnalyticsCapstone.pptx
+++ b/DataAnalyticsCapstone.pptx
@@ -2523,7 +2523,7 @@
           <a:p>
             <a:fld id="{2EEEE1E7-CFF6-404A-9DF9-3DF1CD00B0AD}" type="datetimeFigureOut">
               <a:rPr lang="en-US" smtClean="0"/>
-              <a:t>3/16/2025</a:t>
+              <a:t>3/18/2025</a:t>
             </a:fld>
             <a:endParaRPr lang="en-US"/>
           </a:p>
@@ -3128,7 +3128,7 @@
           <a:p>
             <a:fld id="{3391A759-BFF8-4B5B-9ECE-D93AC303B331}" type="datetime1">
               <a:rPr lang="en-US" smtClean="0"/>
-              <a:t>3/16/2025</a:t>
+              <a:t>3/18/2025</a:t>
             </a:fld>
             <a:endParaRPr lang="en-US"/>
           </a:p>
@@ -3382,7 +3382,7 @@
           <a:p>
             <a:fld id="{6DFDF398-5DA3-4937-BE3F-7CA1B9158252}" type="datetime1">
               <a:rPr lang="en-US" smtClean="0"/>
-              <a:t>3/16/2025</a:t>
+              <a:t>3/18/2025</a:t>
             </a:fld>
             <a:endParaRPr lang="en-US"/>
           </a:p>
@@ -3592,7 +3592,7 @@
           <a:p>
             <a:fld id="{8F191ED9-F929-4A92-90F9-3C9C84ABBE83}" type="datetime1">
               <a:rPr lang="en-US" smtClean="0"/>
-              <a:t>3/16/2025</a:t>
+              <a:t>3/18/2025</a:t>
             </a:fld>
             <a:endParaRPr lang="en-US"/>
           </a:p>
@@ -3847,7 +3847,7 @@
           <a:p>
             <a:fld id="{EEBAB316-A2E6-49F2-825C-64AA951E4184}" type="datetime1">
               <a:rPr lang="en-US" smtClean="0"/>
-              <a:t>3/16/2025</a:t>
+              <a:t>3/18/2025</a:t>
             </a:fld>
             <a:endParaRPr lang="en-US"/>
           </a:p>
@@ -4125,7 +4125,7 @@
           <a:p>
             <a:fld id="{5AE9748B-ADD6-4C5A-8C2A-A39721276E74}" type="datetime1">
               <a:rPr lang="en-US" smtClean="0"/>
-              <a:t>3/16/2025</a:t>
+              <a:t>3/18/2025</a:t>
             </a:fld>
             <a:endParaRPr lang="en-US"/>
           </a:p>
@@ -4397,7 +4397,7 @@
           <a:p>
             <a:fld id="{7241FB0F-3C5C-4949-B933-9C7E511ED094}" type="datetime1">
               <a:rPr lang="en-US" smtClean="0"/>
-              <a:t>3/16/2025</a:t>
+              <a:t>3/18/2025</a:t>
             </a:fld>
             <a:endParaRPr lang="en-US"/>
           </a:p>
@@ -4885,7 +4885,7 @@
           <a:p>
             <a:fld id="{C2F01D58-E949-4BCB-829A-BBF80E38D59C}" type="datetime1">
               <a:rPr lang="en-US" smtClean="0"/>
-              <a:t>3/16/2025</a:t>
+              <a:t>3/18/2025</a:t>
             </a:fld>
             <a:endParaRPr lang="en-US"/>
           </a:p>
@@ -5027,7 +5027,7 @@
           <a:p>
             <a:fld id="{FF10A846-0DA4-4D92-9BF1-DE8C52C1F4DF}" type="datetime1">
               <a:rPr lang="en-US" smtClean="0"/>
-              <a:t>3/16/2025</a:t>
+              <a:t>3/18/2025</a:t>
             </a:fld>
             <a:endParaRPr lang="en-US"/>
           </a:p>
@@ -5140,7 +5140,7 @@
           <a:p>
             <a:fld id="{E9412331-4A9C-472F-A7FA-968157338839}" type="datetime1">
               <a:rPr lang="en-US" smtClean="0"/>
-              <a:t>3/16/2025</a:t>
+              <a:t>3/18/2025</a:t>
             </a:fld>
             <a:endParaRPr lang="en-US"/>
           </a:p>
@@ -5459,7 +5459,7 @@
           <a:p>
             <a:fld id="{A2197F3D-ED52-43FD-A26D-318B71534485}" type="datetime1">
               <a:rPr lang="en-US" smtClean="0"/>
-              <a:t>3/16/2025</a:t>
+              <a:t>3/18/2025</a:t>
             </a:fld>
             <a:endParaRPr lang="en-US"/>
           </a:p>
@@ -5756,7 +5756,7 @@
           <a:p>
             <a:fld id="{3D291FA4-6264-4BB8-B3B5-77711EED2D82}" type="datetime1">
               <a:rPr lang="en-US" smtClean="0"/>
-              <a:t>3/16/2025</a:t>
+              <a:t>3/18/2025</a:t>
             </a:fld>
             <a:endParaRPr lang="en-US"/>
           </a:p>
@@ -5997,7 +5997,7 @@
           <a:p>
             <a:fld id="{E7F6A1D9-D323-4F4E-8655-25E2D32CE742}" type="datetime1">
               <a:rPr lang="en-US" smtClean="0"/>
-              <a:t>3/16/2025</a:t>
+              <a:t>3/18/2025</a:t>
             </a:fld>
             <a:endParaRPr lang="en-US"/>
           </a:p>
@@ -9035,7 +9035,7 @@
         <p:spPr>
           <a:xfrm>
             <a:off x="517870" y="2183327"/>
-            <a:ext cx="4676982" cy="1631216"/>
+            <a:ext cx="4676982" cy="2554545"/>
           </a:xfrm>
           <a:prstGeom prst="rect">
             <a:avLst/>
@@ -9072,6 +9072,23 @@
             <a:r>
               <a:rPr lang="en-US" sz="2000" dirty="0"/>
               <a:t>Casual riders have a higher average ride time</a:t>
+            </a:r>
+          </a:p>
+          <a:p>
+            <a:pPr marL="285750" indent="-285750">
+              <a:buFont typeface="Arial" panose="020B0604020202020204" pitchFamily="34" charset="0"/>
+              <a:buChar char="•"/>
+            </a:pPr>
+            <a:endParaRPr lang="en-US" sz="2000" dirty="0"/>
+          </a:p>
+          <a:p>
+            <a:pPr marL="285750" indent="-285750">
+              <a:buFont typeface="Arial" panose="020B0604020202020204" pitchFamily="34" charset="0"/>
+              <a:buChar char="•"/>
+            </a:pPr>
+            <a:r>
+              <a:rPr lang="en-US" sz="2000" dirty="0"/>
+              <a:t>Casual riders on average ride for 10:32 longer than membership riders</a:t>
             </a:r>
           </a:p>
         </p:txBody>
@@ -9413,23 +9430,6 @@
             <a:r>
               <a:rPr lang="en-US" dirty="0"/>
               <a:t>Casual rides notably low during the winter months</a:t>
-            </a:r>
-          </a:p>
-          <a:p>
-            <a:pPr marL="342900" indent="-342900">
-              <a:buFont typeface="Arial" panose="020B0604020202020204" pitchFamily="34" charset="0"/>
-              <a:buChar char="•"/>
-            </a:pPr>
-            <a:endParaRPr lang="en-US" dirty="0"/>
-          </a:p>
-          <a:p>
-            <a:pPr marL="342900" indent="-342900">
-              <a:buFont typeface="Arial" panose="020B0604020202020204" pitchFamily="34" charset="0"/>
-              <a:buChar char="•"/>
-            </a:pPr>
-            <a:r>
-              <a:rPr lang="en-US" dirty="0"/>
-              <a:t>Potentially adapt snow tires to the bikes during those months</a:t>
             </a:r>
           </a:p>
         </p:txBody>

</xml_diff>